<commit_message>
Update variable and syntax.
</commit_message>
<xml_diff>
--- a/Gaddis Python 6e Chapter 04.pptx
+++ b/Gaddis Python 6e Chapter 04.pptx
@@ -4,11 +4,8 @@
   <p:sldMasterIdLst>
     <p:sldMasterId id="2147483648" r:id="rId1"/>
   </p:sldMasterIdLst>
-  <p:notesMasterIdLst>
-    <p:notesMasterId r:id="rId45"/>
-  </p:notesMasterIdLst>
   <p:handoutMasterIdLst>
-    <p:handoutMasterId r:id="rId46"/>
+    <p:handoutMasterId r:id="rId45"/>
   </p:handoutMasterIdLst>
   <p:sldIdLst>
     <p:sldId id="256" r:id="rId2"/>
@@ -327,7 +324,7 @@
               <a:pPr>
                 <a:defRPr/>
               </a:pPr>
-              <a:t>2/20/2023</a:t>
+              <a:t>7/22/2022</a:t>
             </a:fld>
             <a:endParaRPr lang="en-US"/>
           </a:p>
@@ -431,523 +428,6 @@
   </p:cSld>
   <p:clrMap bg1="lt1" tx1="dk1" bg2="lt2" tx2="dk2" accent1="accent1" accent2="accent2" accent3="accent3" accent4="accent4" accent5="accent5" accent6="accent6" hlink="hlink" folHlink="folHlink"/>
 </p:handoutMaster>
-</file>
-
-<file path=ppt/notesMasters/notesMaster1.xml><?xml version="1.0" encoding="utf-8"?>
-<p:notesMaster xmlns:a="http://schemas.openxmlformats.org/drawingml/2006/main" xmlns:r="http://schemas.openxmlformats.org/officeDocument/2006/relationships" xmlns:p="http://schemas.openxmlformats.org/presentationml/2006/main">
-  <p:cSld>
-    <p:bg>
-      <p:bgRef idx="1001">
-        <a:schemeClr val="bg1"/>
-      </p:bgRef>
-    </p:bg>
-    <p:spTree>
-      <p:nvGrpSpPr>
-        <p:cNvPr id="1" name=""/>
-        <p:cNvGrpSpPr/>
-        <p:nvPr/>
-      </p:nvGrpSpPr>
-      <p:grpSpPr>
-        <a:xfrm>
-          <a:off x="0" y="0"/>
-          <a:ext cx="0" cy="0"/>
-          <a:chOff x="0" y="0"/>
-          <a:chExt cx="0" cy="0"/>
-        </a:xfrm>
-      </p:grpSpPr>
-      <p:sp>
-        <p:nvSpPr>
-          <p:cNvPr id="2" name="Header Placeholder 1"/>
-          <p:cNvSpPr>
-            <a:spLocks noGrp="1"/>
-          </p:cNvSpPr>
-          <p:nvPr>
-            <p:ph type="hdr" sz="quarter"/>
-          </p:nvPr>
-        </p:nvSpPr>
-        <p:spPr>
-          <a:xfrm>
-            <a:off x="0" y="0"/>
-            <a:ext cx="2971800" cy="458788"/>
-          </a:xfrm>
-          <a:prstGeom prst="rect">
-            <a:avLst/>
-          </a:prstGeom>
-        </p:spPr>
-        <p:txBody>
-          <a:bodyPr vert="horz" lIns="91440" tIns="45720" rIns="91440" bIns="45720" rtlCol="0"/>
-          <a:lstStyle>
-            <a:lvl1pPr algn="l">
-              <a:defRPr sz="1200"/>
-            </a:lvl1pPr>
-          </a:lstStyle>
-          <a:p>
-            <a:endParaRPr lang="en-US"/>
-          </a:p>
-        </p:txBody>
-      </p:sp>
-      <p:sp>
-        <p:nvSpPr>
-          <p:cNvPr id="3" name="Date Placeholder 2"/>
-          <p:cNvSpPr>
-            <a:spLocks noGrp="1"/>
-          </p:cNvSpPr>
-          <p:nvPr>
-            <p:ph type="dt" idx="1"/>
-          </p:nvPr>
-        </p:nvSpPr>
-        <p:spPr>
-          <a:xfrm>
-            <a:off x="3884613" y="0"/>
-            <a:ext cx="2971800" cy="458788"/>
-          </a:xfrm>
-          <a:prstGeom prst="rect">
-            <a:avLst/>
-          </a:prstGeom>
-        </p:spPr>
-        <p:txBody>
-          <a:bodyPr vert="horz" lIns="91440" tIns="45720" rIns="91440" bIns="45720" rtlCol="0"/>
-          <a:lstStyle>
-            <a:lvl1pPr algn="r">
-              <a:defRPr sz="1200"/>
-            </a:lvl1pPr>
-          </a:lstStyle>
-          <a:p>
-            <a:fld id="{C686420B-6279-42BF-AC70-7023C272EEE8}" type="datetimeFigureOut">
-              <a:rPr lang="en-US" smtClean="0"/>
-              <a:t>2/20/2023</a:t>
-            </a:fld>
-            <a:endParaRPr lang="en-US"/>
-          </a:p>
-        </p:txBody>
-      </p:sp>
-      <p:sp>
-        <p:nvSpPr>
-          <p:cNvPr id="4" name="Slide Image Placeholder 3"/>
-          <p:cNvSpPr>
-            <a:spLocks noGrp="1" noRot="1" noChangeAspect="1"/>
-          </p:cNvSpPr>
-          <p:nvPr>
-            <p:ph type="sldImg" idx="2"/>
-          </p:nvPr>
-        </p:nvSpPr>
-        <p:spPr>
-          <a:xfrm>
-            <a:off x="1371600" y="1143000"/>
-            <a:ext cx="4114800" cy="3086100"/>
-          </a:xfrm>
-          <a:prstGeom prst="rect">
-            <a:avLst/>
-          </a:prstGeom>
-          <a:noFill/>
-          <a:ln w="12700">
-            <a:solidFill>
-              <a:prstClr val="black"/>
-            </a:solidFill>
-          </a:ln>
-        </p:spPr>
-        <p:txBody>
-          <a:bodyPr vert="horz" lIns="91440" tIns="45720" rIns="91440" bIns="45720" rtlCol="0" anchor="ctr"/>
-          <a:lstStyle/>
-          <a:p>
-            <a:endParaRPr lang="en-US"/>
-          </a:p>
-        </p:txBody>
-      </p:sp>
-      <p:sp>
-        <p:nvSpPr>
-          <p:cNvPr id="5" name="Notes Placeholder 4"/>
-          <p:cNvSpPr>
-            <a:spLocks noGrp="1"/>
-          </p:cNvSpPr>
-          <p:nvPr>
-            <p:ph type="body" sz="quarter" idx="3"/>
-          </p:nvPr>
-        </p:nvSpPr>
-        <p:spPr>
-          <a:xfrm>
-            <a:off x="685800" y="4400550"/>
-            <a:ext cx="5486400" cy="3600450"/>
-          </a:xfrm>
-          <a:prstGeom prst="rect">
-            <a:avLst/>
-          </a:prstGeom>
-        </p:spPr>
-        <p:txBody>
-          <a:bodyPr vert="horz" lIns="91440" tIns="45720" rIns="91440" bIns="45720" rtlCol="0"/>
-          <a:lstStyle/>
-          <a:p>
-            <a:pPr lvl="0"/>
-            <a:r>
-              <a:rPr lang="en-US"/>
-              <a:t>Click to edit Master text styles</a:t>
-            </a:r>
-          </a:p>
-          <a:p>
-            <a:pPr lvl="1"/>
-            <a:r>
-              <a:rPr lang="en-US"/>
-              <a:t>Second level</a:t>
-            </a:r>
-          </a:p>
-          <a:p>
-            <a:pPr lvl="2"/>
-            <a:r>
-              <a:rPr lang="en-US"/>
-              <a:t>Third level</a:t>
-            </a:r>
-          </a:p>
-          <a:p>
-            <a:pPr lvl="3"/>
-            <a:r>
-              <a:rPr lang="en-US"/>
-              <a:t>Fourth level</a:t>
-            </a:r>
-          </a:p>
-          <a:p>
-            <a:pPr lvl="4"/>
-            <a:r>
-              <a:rPr lang="en-US"/>
-              <a:t>Fifth level</a:t>
-            </a:r>
-          </a:p>
-        </p:txBody>
-      </p:sp>
-      <p:sp>
-        <p:nvSpPr>
-          <p:cNvPr id="6" name="Footer Placeholder 5"/>
-          <p:cNvSpPr>
-            <a:spLocks noGrp="1"/>
-          </p:cNvSpPr>
-          <p:nvPr>
-            <p:ph type="ftr" sz="quarter" idx="4"/>
-          </p:nvPr>
-        </p:nvSpPr>
-        <p:spPr>
-          <a:xfrm>
-            <a:off x="0" y="8685213"/>
-            <a:ext cx="2971800" cy="458787"/>
-          </a:xfrm>
-          <a:prstGeom prst="rect">
-            <a:avLst/>
-          </a:prstGeom>
-        </p:spPr>
-        <p:txBody>
-          <a:bodyPr vert="horz" lIns="91440" tIns="45720" rIns="91440" bIns="45720" rtlCol="0" anchor="b"/>
-          <a:lstStyle>
-            <a:lvl1pPr algn="l">
-              <a:defRPr sz="1200"/>
-            </a:lvl1pPr>
-          </a:lstStyle>
-          <a:p>
-            <a:endParaRPr lang="en-US"/>
-          </a:p>
-        </p:txBody>
-      </p:sp>
-      <p:sp>
-        <p:nvSpPr>
-          <p:cNvPr id="7" name="Slide Number Placeholder 6"/>
-          <p:cNvSpPr>
-            <a:spLocks noGrp="1"/>
-          </p:cNvSpPr>
-          <p:nvPr>
-            <p:ph type="sldNum" sz="quarter" idx="5"/>
-          </p:nvPr>
-        </p:nvSpPr>
-        <p:spPr>
-          <a:xfrm>
-            <a:off x="3884613" y="8685213"/>
-            <a:ext cx="2971800" cy="458787"/>
-          </a:xfrm>
-          <a:prstGeom prst="rect">
-            <a:avLst/>
-          </a:prstGeom>
-        </p:spPr>
-        <p:txBody>
-          <a:bodyPr vert="horz" lIns="91440" tIns="45720" rIns="91440" bIns="45720" rtlCol="0" anchor="b"/>
-          <a:lstStyle>
-            <a:lvl1pPr algn="r">
-              <a:defRPr sz="1200"/>
-            </a:lvl1pPr>
-          </a:lstStyle>
-          <a:p>
-            <a:fld id="{EABA3727-1630-4A4E-9C89-6398B9F93073}" type="slidenum">
-              <a:rPr lang="en-US" smtClean="0"/>
-              <a:t>‹#›</a:t>
-            </a:fld>
-            <a:endParaRPr lang="en-US"/>
-          </a:p>
-        </p:txBody>
-      </p:sp>
-    </p:spTree>
-    <p:extLst>
-      <p:ext uri="{BB962C8B-B14F-4D97-AF65-F5344CB8AC3E}">
-        <p14:creationId xmlns:p14="http://schemas.microsoft.com/office/powerpoint/2010/main" val="2809063265"/>
-      </p:ext>
-    </p:extLst>
-  </p:cSld>
-  <p:clrMap bg1="lt1" tx1="dk1" bg2="lt2" tx2="dk2" accent1="accent1" accent2="accent2" accent3="accent3" accent4="accent4" accent5="accent5" accent6="accent6" hlink="hlink" folHlink="folHlink"/>
-  <p:notesStyle>
-    <a:lvl1pPr marL="0" algn="l" defTabSz="914400" rtl="0" eaLnBrk="1" latinLnBrk="0" hangingPunct="1">
-      <a:defRPr sz="1200" kern="1200">
-        <a:solidFill>
-          <a:schemeClr val="tx1"/>
-        </a:solidFill>
-        <a:latin typeface="+mn-lt"/>
-        <a:ea typeface="+mn-ea"/>
-        <a:cs typeface="+mn-cs"/>
-      </a:defRPr>
-    </a:lvl1pPr>
-    <a:lvl2pPr marL="457200" algn="l" defTabSz="914400" rtl="0" eaLnBrk="1" latinLnBrk="0" hangingPunct="1">
-      <a:defRPr sz="1200" kern="1200">
-        <a:solidFill>
-          <a:schemeClr val="tx1"/>
-        </a:solidFill>
-        <a:latin typeface="+mn-lt"/>
-        <a:ea typeface="+mn-ea"/>
-        <a:cs typeface="+mn-cs"/>
-      </a:defRPr>
-    </a:lvl2pPr>
-    <a:lvl3pPr marL="914400" algn="l" defTabSz="914400" rtl="0" eaLnBrk="1" latinLnBrk="0" hangingPunct="1">
-      <a:defRPr sz="1200" kern="1200">
-        <a:solidFill>
-          <a:schemeClr val="tx1"/>
-        </a:solidFill>
-        <a:latin typeface="+mn-lt"/>
-        <a:ea typeface="+mn-ea"/>
-        <a:cs typeface="+mn-cs"/>
-      </a:defRPr>
-    </a:lvl3pPr>
-    <a:lvl4pPr marL="1371600" algn="l" defTabSz="914400" rtl="0" eaLnBrk="1" latinLnBrk="0" hangingPunct="1">
-      <a:defRPr sz="1200" kern="1200">
-        <a:solidFill>
-          <a:schemeClr val="tx1"/>
-        </a:solidFill>
-        <a:latin typeface="+mn-lt"/>
-        <a:ea typeface="+mn-ea"/>
-        <a:cs typeface="+mn-cs"/>
-      </a:defRPr>
-    </a:lvl4pPr>
-    <a:lvl5pPr marL="1828800" algn="l" defTabSz="914400" rtl="0" eaLnBrk="1" latinLnBrk="0" hangingPunct="1">
-      <a:defRPr sz="1200" kern="1200">
-        <a:solidFill>
-          <a:schemeClr val="tx1"/>
-        </a:solidFill>
-        <a:latin typeface="+mn-lt"/>
-        <a:ea typeface="+mn-ea"/>
-        <a:cs typeface="+mn-cs"/>
-      </a:defRPr>
-    </a:lvl5pPr>
-    <a:lvl6pPr marL="2286000" algn="l" defTabSz="914400" rtl="0" eaLnBrk="1" latinLnBrk="0" hangingPunct="1">
-      <a:defRPr sz="1200" kern="1200">
-        <a:solidFill>
-          <a:schemeClr val="tx1"/>
-        </a:solidFill>
-        <a:latin typeface="+mn-lt"/>
-        <a:ea typeface="+mn-ea"/>
-        <a:cs typeface="+mn-cs"/>
-      </a:defRPr>
-    </a:lvl6pPr>
-    <a:lvl7pPr marL="2743200" algn="l" defTabSz="914400" rtl="0" eaLnBrk="1" latinLnBrk="0" hangingPunct="1">
-      <a:defRPr sz="1200" kern="1200">
-        <a:solidFill>
-          <a:schemeClr val="tx1"/>
-        </a:solidFill>
-        <a:latin typeface="+mn-lt"/>
-        <a:ea typeface="+mn-ea"/>
-        <a:cs typeface="+mn-cs"/>
-      </a:defRPr>
-    </a:lvl7pPr>
-    <a:lvl8pPr marL="3200400" algn="l" defTabSz="914400" rtl="0" eaLnBrk="1" latinLnBrk="0" hangingPunct="1">
-      <a:defRPr sz="1200" kern="1200">
-        <a:solidFill>
-          <a:schemeClr val="tx1"/>
-        </a:solidFill>
-        <a:latin typeface="+mn-lt"/>
-        <a:ea typeface="+mn-ea"/>
-        <a:cs typeface="+mn-cs"/>
-      </a:defRPr>
-    </a:lvl8pPr>
-    <a:lvl9pPr marL="3657600" algn="l" defTabSz="914400" rtl="0" eaLnBrk="1" latinLnBrk="0" hangingPunct="1">
-      <a:defRPr sz="1200" kern="1200">
-        <a:solidFill>
-          <a:schemeClr val="tx1"/>
-        </a:solidFill>
-        <a:latin typeface="+mn-lt"/>
-        <a:ea typeface="+mn-ea"/>
-        <a:cs typeface="+mn-cs"/>
-      </a:defRPr>
-    </a:lvl9pPr>
-  </p:notesStyle>
-</p:notesMaster>
-</file>
-
-<file path=ppt/notesSlides/notesSlide1.xml><?xml version="1.0" encoding="utf-8"?>
-<p:notes xmlns:a="http://schemas.openxmlformats.org/drawingml/2006/main" xmlns:r="http://schemas.openxmlformats.org/officeDocument/2006/relationships" xmlns:p="http://schemas.openxmlformats.org/presentationml/2006/main">
-  <p:cSld>
-    <p:spTree>
-      <p:nvGrpSpPr>
-        <p:cNvPr id="1" name=""/>
-        <p:cNvGrpSpPr/>
-        <p:nvPr/>
-      </p:nvGrpSpPr>
-      <p:grpSpPr>
-        <a:xfrm>
-          <a:off x="0" y="0"/>
-          <a:ext cx="0" cy="0"/>
-          <a:chOff x="0" y="0"/>
-          <a:chExt cx="0" cy="0"/>
-        </a:xfrm>
-      </p:grpSpPr>
-      <p:sp>
-        <p:nvSpPr>
-          <p:cNvPr id="2" name="Slide Image Placeholder 1"/>
-          <p:cNvSpPr>
-            <a:spLocks noGrp="1" noRot="1" noChangeAspect="1"/>
-          </p:cNvSpPr>
-          <p:nvPr>
-            <p:ph type="sldImg"/>
-          </p:nvPr>
-        </p:nvSpPr>
-        <p:spPr/>
-      </p:sp>
-      <p:sp>
-        <p:nvSpPr>
-          <p:cNvPr id="3" name="Notes Placeholder 2"/>
-          <p:cNvSpPr>
-            <a:spLocks noGrp="1"/>
-          </p:cNvSpPr>
-          <p:nvPr>
-            <p:ph type="body" idx="1"/>
-          </p:nvPr>
-        </p:nvSpPr>
-        <p:spPr/>
-        <p:txBody>
-          <a:bodyPr/>
-          <a:lstStyle/>
-          <a:p>
-            <a:endParaRPr lang="en-US" dirty="0"/>
-          </a:p>
-        </p:txBody>
-      </p:sp>
-      <p:sp>
-        <p:nvSpPr>
-          <p:cNvPr id="4" name="Slide Number Placeholder 3"/>
-          <p:cNvSpPr>
-            <a:spLocks noGrp="1"/>
-          </p:cNvSpPr>
-          <p:nvPr>
-            <p:ph type="sldNum" sz="quarter" idx="5"/>
-          </p:nvPr>
-        </p:nvSpPr>
-        <p:spPr/>
-        <p:txBody>
-          <a:bodyPr/>
-          <a:lstStyle/>
-          <a:p>
-            <a:fld id="{EABA3727-1630-4A4E-9C89-6398B9F93073}" type="slidenum">
-              <a:rPr lang="en-US" smtClean="0"/>
-              <a:t>2</a:t>
-            </a:fld>
-            <a:endParaRPr lang="en-US"/>
-          </a:p>
-        </p:txBody>
-      </p:sp>
-    </p:spTree>
-    <p:extLst>
-      <p:ext uri="{BB962C8B-B14F-4D97-AF65-F5344CB8AC3E}">
-        <p14:creationId xmlns:p14="http://schemas.microsoft.com/office/powerpoint/2010/main" val="118215227"/>
-      </p:ext>
-    </p:extLst>
-  </p:cSld>
-  <p:clrMapOvr>
-    <a:masterClrMapping/>
-  </p:clrMapOvr>
-</p:notes>
-</file>
-
-<file path=ppt/notesSlides/notesSlide2.xml><?xml version="1.0" encoding="utf-8"?>
-<p:notes xmlns:a="http://schemas.openxmlformats.org/drawingml/2006/main" xmlns:r="http://schemas.openxmlformats.org/officeDocument/2006/relationships" xmlns:p="http://schemas.openxmlformats.org/presentationml/2006/main">
-  <p:cSld>
-    <p:spTree>
-      <p:nvGrpSpPr>
-        <p:cNvPr id="1" name=""/>
-        <p:cNvGrpSpPr/>
-        <p:nvPr/>
-      </p:nvGrpSpPr>
-      <p:grpSpPr>
-        <a:xfrm>
-          <a:off x="0" y="0"/>
-          <a:ext cx="0" cy="0"/>
-          <a:chOff x="0" y="0"/>
-          <a:chExt cx="0" cy="0"/>
-        </a:xfrm>
-      </p:grpSpPr>
-      <p:sp>
-        <p:nvSpPr>
-          <p:cNvPr id="2" name="Slide Image Placeholder 1"/>
-          <p:cNvSpPr>
-            <a:spLocks noGrp="1" noRot="1" noChangeAspect="1"/>
-          </p:cNvSpPr>
-          <p:nvPr>
-            <p:ph type="sldImg"/>
-          </p:nvPr>
-        </p:nvSpPr>
-        <p:spPr/>
-      </p:sp>
-      <p:sp>
-        <p:nvSpPr>
-          <p:cNvPr id="3" name="Notes Placeholder 2"/>
-          <p:cNvSpPr>
-            <a:spLocks noGrp="1"/>
-          </p:cNvSpPr>
-          <p:nvPr>
-            <p:ph type="body" idx="1"/>
-          </p:nvPr>
-        </p:nvSpPr>
-        <p:spPr/>
-        <p:txBody>
-          <a:bodyPr/>
-          <a:lstStyle/>
-          <a:p>
-            <a:endParaRPr lang="en-US" dirty="0"/>
-          </a:p>
-        </p:txBody>
-      </p:sp>
-      <p:sp>
-        <p:nvSpPr>
-          <p:cNvPr id="4" name="Slide Number Placeholder 3"/>
-          <p:cNvSpPr>
-            <a:spLocks noGrp="1"/>
-          </p:cNvSpPr>
-          <p:nvPr>
-            <p:ph type="sldNum" sz="quarter" idx="5"/>
-          </p:nvPr>
-        </p:nvSpPr>
-        <p:spPr/>
-        <p:txBody>
-          <a:bodyPr/>
-          <a:lstStyle/>
-          <a:p>
-            <a:fld id="{EABA3727-1630-4A4E-9C89-6398B9F93073}" type="slidenum">
-              <a:rPr lang="en-US" smtClean="0"/>
-              <a:t>8</a:t>
-            </a:fld>
-            <a:endParaRPr lang="en-US"/>
-          </a:p>
-        </p:txBody>
-      </p:sp>
-    </p:spTree>
-    <p:extLst>
-      <p:ext uri="{BB962C8B-B14F-4D97-AF65-F5344CB8AC3E}">
-        <p14:creationId xmlns:p14="http://schemas.microsoft.com/office/powerpoint/2010/main" val="772349322"/>
-      </p:ext>
-    </p:extLst>
-  </p:cSld>
-  <p:clrMapOvr>
-    <a:masterClrMapping/>
-  </p:clrMapOvr>
-</p:notes>
 </file>
 
 <file path=ppt/slideLayouts/slideLayout1.xml><?xml version="1.0" encoding="utf-8"?>
@@ -6927,7 +6407,7 @@
               <a:buChar char="•"/>
             </a:pPr>
             <a:r>
-              <a:rPr lang="en-US" altLang="en-US" sz="2400" dirty="0"/>
+              <a:rPr lang="en-US" altLang="en-US" sz="2400"/>
               <a:t>Introduction to Repetition Structures</a:t>
             </a:r>
           </a:p>
@@ -6937,18 +6417,18 @@
               <a:buChar char="•"/>
             </a:pPr>
             <a:r>
-              <a:rPr lang="en-US" altLang="en-US" sz="2400" dirty="0"/>
+              <a:rPr lang="en-US" altLang="en-US" sz="2400"/>
               <a:t>The </a:t>
             </a:r>
             <a:r>
-              <a:rPr lang="en-US" altLang="en-US" sz="2400" dirty="0">
+              <a:rPr lang="en-US" altLang="en-US" sz="2400">
                 <a:latin typeface="Courier New" panose="02070309020205020404" pitchFamily="49" charset="0"/>
                 <a:cs typeface="Courier New" panose="02070309020205020404" pitchFamily="49" charset="0"/>
               </a:rPr>
               <a:t>while</a:t>
             </a:r>
             <a:r>
-              <a:rPr lang="en-US" altLang="en-US" sz="2400" dirty="0"/>
+              <a:rPr lang="en-US" altLang="en-US" sz="2400"/>
               <a:t> Loop: a Condition-Controlled Loop</a:t>
             </a:r>
           </a:p>
@@ -6958,18 +6438,18 @@
               <a:buChar char="•"/>
             </a:pPr>
             <a:r>
-              <a:rPr lang="en-US" altLang="en-US" sz="2400" dirty="0"/>
+              <a:rPr lang="en-US" altLang="en-US" sz="2400"/>
               <a:t>The </a:t>
             </a:r>
             <a:r>
-              <a:rPr lang="en-US" altLang="en-US" sz="2400" dirty="0">
+              <a:rPr lang="en-US" altLang="en-US" sz="2400">
                 <a:latin typeface="Courier New" panose="02070309020205020404" pitchFamily="49" charset="0"/>
                 <a:cs typeface="Courier New" panose="02070309020205020404" pitchFamily="49" charset="0"/>
               </a:rPr>
               <a:t>for</a:t>
             </a:r>
             <a:r>
-              <a:rPr lang="en-US" altLang="en-US" sz="2400" dirty="0"/>
+              <a:rPr lang="en-US" altLang="en-US" sz="2400"/>
               <a:t> Loop: a Count-Controlled Loop</a:t>
             </a:r>
           </a:p>
@@ -6979,7 +6459,7 @@
               <a:buChar char="•"/>
             </a:pPr>
             <a:r>
-              <a:rPr lang="en-US" altLang="en-US" sz="2400" dirty="0"/>
+              <a:rPr lang="en-US" altLang="en-US" sz="2400"/>
               <a:t>Calculating a Running Total</a:t>
             </a:r>
           </a:p>
@@ -6989,16 +6469,8 @@
               <a:buChar char="•"/>
             </a:pPr>
             <a:r>
-              <a:rPr lang="en-US" altLang="en-US" sz="2400" dirty="0"/>
-              <a:t>Sentinels (</a:t>
-            </a:r>
-            <a:r>
-              <a:rPr lang="en-US" altLang="en-US" sz="2400" b="0" dirty="0"/>
-              <a:t>value indicate the end of data</a:t>
-            </a:r>
-            <a:r>
-              <a:rPr lang="en-US" altLang="en-US" sz="2400" dirty="0"/>
-              <a:t>)</a:t>
+              <a:rPr lang="en-US" altLang="en-US" sz="2400"/>
+              <a:t>Sentinels</a:t>
             </a:r>
           </a:p>
           <a:p>
@@ -7007,7 +6479,7 @@
               <a:buChar char="•"/>
             </a:pPr>
             <a:r>
-              <a:rPr lang="en-US" altLang="en-US" sz="2400" dirty="0"/>
+              <a:rPr lang="en-US" altLang="en-US" sz="2400"/>
               <a:t>Input Validation Loops</a:t>
             </a:r>
           </a:p>
@@ -7017,7 +6489,7 @@
               <a:buChar char="•"/>
             </a:pPr>
             <a:r>
-              <a:rPr lang="en-US" altLang="en-US" sz="2400" dirty="0"/>
+              <a:rPr lang="en-US" altLang="en-US" sz="2400"/>
               <a:t>Nested Loops</a:t>
             </a:r>
           </a:p>
@@ -7027,40 +6499,40 @@
               <a:buChar char="•"/>
             </a:pPr>
             <a:r>
-              <a:rPr lang="en-US" altLang="en-US" sz="2400" dirty="0"/>
+              <a:rPr lang="en-US" altLang="en-US" sz="2400"/>
               <a:t>Using </a:t>
             </a:r>
             <a:r>
-              <a:rPr lang="en-US" altLang="en-US" sz="2400" dirty="0">
+              <a:rPr lang="en-US" altLang="en-US" sz="2400">
                 <a:latin typeface="Courier New" panose="02070309020205020404" pitchFamily="49" charset="0"/>
                 <a:cs typeface="Courier New" panose="02070309020205020404" pitchFamily="49" charset="0"/>
               </a:rPr>
               <a:t>break</a:t>
             </a:r>
             <a:r>
-              <a:rPr lang="en-US" altLang="en-US" sz="2400" dirty="0"/>
+              <a:rPr lang="en-US" altLang="en-US" sz="2400"/>
               <a:t>, </a:t>
             </a:r>
             <a:r>
-              <a:rPr lang="en-US" altLang="en-US" sz="2400" dirty="0">
+              <a:rPr lang="en-US" altLang="en-US" sz="2400">
                 <a:latin typeface="Courier New" panose="02070309020205020404" pitchFamily="49" charset="0"/>
                 <a:cs typeface="Courier New" panose="02070309020205020404" pitchFamily="49" charset="0"/>
               </a:rPr>
               <a:t>continue</a:t>
             </a:r>
             <a:r>
-              <a:rPr lang="en-US" altLang="en-US" sz="2400" dirty="0"/>
+              <a:rPr lang="en-US" altLang="en-US" sz="2400"/>
               <a:t>, and </a:t>
             </a:r>
             <a:r>
-              <a:rPr lang="en-US" altLang="en-US" sz="2400" dirty="0">
+              <a:rPr lang="en-US" altLang="en-US" sz="2400">
                 <a:latin typeface="Courier New" panose="02070309020205020404" pitchFamily="49" charset="0"/>
                 <a:cs typeface="Courier New" panose="02070309020205020404" pitchFamily="49" charset="0"/>
               </a:rPr>
               <a:t>else</a:t>
             </a:r>
             <a:r>
-              <a:rPr lang="en-US" altLang="en-US" sz="2400" dirty="0"/>
+              <a:rPr lang="en-US" altLang="en-US" sz="2400"/>
               <a:t> with Loops</a:t>
             </a:r>
           </a:p>
@@ -7070,7 +6542,7 @@
               <a:buChar char="•"/>
             </a:pPr>
             <a:r>
-              <a:rPr lang="en-US" altLang="en-US" sz="2400" dirty="0"/>
+              <a:rPr lang="en-US" altLang="en-US" sz="2400"/>
               <a:t>Turtle Graphics: Using Loops to Draw Designs</a:t>
             </a:r>
           </a:p>
@@ -16649,7 +16121,7 @@
           <p:nvPr/>
         </p:nvPicPr>
         <p:blipFill>
-          <a:blip r:embed="rId3">
+          <a:blip r:embed="rId2">
             <a:extLst>
               <a:ext uri="{28A0092B-C50C-407E-A947-70E740481C1C}">
                 <a14:useLocalDpi xmlns:a14="http://schemas.microsoft.com/office/drawing/2010/main" val="0"/>
@@ -17691,301 +17163,6 @@
         <a:sysClr val="window" lastClr="FFFFFF"/>
       </a:lt1>
       <a:dk2>
-        <a:srgbClr val="44546A"/>
-      </a:dk2>
-      <a:lt2>
-        <a:srgbClr val="E7E6E6"/>
-      </a:lt2>
-      <a:accent1>
-        <a:srgbClr val="4472C4"/>
-      </a:accent1>
-      <a:accent2>
-        <a:srgbClr val="ED7D31"/>
-      </a:accent2>
-      <a:accent3>
-        <a:srgbClr val="A5A5A5"/>
-      </a:accent3>
-      <a:accent4>
-        <a:srgbClr val="FFC000"/>
-      </a:accent4>
-      <a:accent5>
-        <a:srgbClr val="5B9BD5"/>
-      </a:accent5>
-      <a:accent6>
-        <a:srgbClr val="70AD47"/>
-      </a:accent6>
-      <a:hlink>
-        <a:srgbClr val="0563C1"/>
-      </a:hlink>
-      <a:folHlink>
-        <a:srgbClr val="954F72"/>
-      </a:folHlink>
-    </a:clrScheme>
-    <a:fontScheme name="Office">
-      <a:majorFont>
-        <a:latin typeface="Calibri Light" panose="020F0302020204030204"/>
-        <a:ea typeface=""/>
-        <a:cs typeface=""/>
-        <a:font script="Jpan" typeface="游ゴシック Light"/>
-        <a:font script="Hang" typeface="맑은 고딕"/>
-        <a:font script="Hans" typeface="等线 Light"/>
-        <a:font script="Hant" typeface="新細明體"/>
-        <a:font script="Arab" typeface="Times New Roman"/>
-        <a:font script="Hebr" typeface="Times New Roman"/>
-        <a:font script="Thai" typeface="Angsana New"/>
-        <a:font script="Ethi" typeface="Nyala"/>
-        <a:font script="Beng" typeface="Vrinda"/>
-        <a:font script="Gujr" typeface="Shruti"/>
-        <a:font script="Khmr" typeface="MoolBoran"/>
-        <a:font script="Knda" typeface="Tunga"/>
-        <a:font script="Guru" typeface="Raavi"/>
-        <a:font script="Cans" typeface="Euphemia"/>
-        <a:font script="Cher" typeface="Plantagenet Cherokee"/>
-        <a:font script="Yiii" typeface="Microsoft Yi Baiti"/>
-        <a:font script="Tibt" typeface="Microsoft Himalaya"/>
-        <a:font script="Thaa" typeface="MV Boli"/>
-        <a:font script="Deva" typeface="Mangal"/>
-        <a:font script="Telu" typeface="Gautami"/>
-        <a:font script="Taml" typeface="Latha"/>
-        <a:font script="Syrc" typeface="Estrangelo Edessa"/>
-        <a:font script="Orya" typeface="Kalinga"/>
-        <a:font script="Mlym" typeface="Kartika"/>
-        <a:font script="Laoo" typeface="DokChampa"/>
-        <a:font script="Sinh" typeface="Iskoola Pota"/>
-        <a:font script="Mong" typeface="Mongolian Baiti"/>
-        <a:font script="Viet" typeface="Times New Roman"/>
-        <a:font script="Uigh" typeface="Microsoft Uighur"/>
-        <a:font script="Geor" typeface="Sylfaen"/>
-        <a:font script="Armn" typeface="Arial"/>
-        <a:font script="Bugi" typeface="Leelawadee UI"/>
-        <a:font script="Bopo" typeface="Microsoft JhengHei"/>
-        <a:font script="Java" typeface="Javanese Text"/>
-        <a:font script="Lisu" typeface="Segoe UI"/>
-        <a:font script="Mymr" typeface="Myanmar Text"/>
-        <a:font script="Nkoo" typeface="Ebrima"/>
-        <a:font script="Olck" typeface="Nirmala UI"/>
-        <a:font script="Osma" typeface="Ebrima"/>
-        <a:font script="Phag" typeface="Phagspa"/>
-        <a:font script="Syrn" typeface="Estrangelo Edessa"/>
-        <a:font script="Syrj" typeface="Estrangelo Edessa"/>
-        <a:font script="Syre" typeface="Estrangelo Edessa"/>
-        <a:font script="Sora" typeface="Nirmala UI"/>
-        <a:font script="Tale" typeface="Microsoft Tai Le"/>
-        <a:font script="Talu" typeface="Microsoft New Tai Lue"/>
-        <a:font script="Tfng" typeface="Ebrima"/>
-      </a:majorFont>
-      <a:minorFont>
-        <a:latin typeface="Calibri" panose="020F0502020204030204"/>
-        <a:ea typeface=""/>
-        <a:cs typeface=""/>
-        <a:font script="Jpan" typeface="游ゴシック"/>
-        <a:font script="Hang" typeface="맑은 고딕"/>
-        <a:font script="Hans" typeface="等线"/>
-        <a:font script="Hant" typeface="新細明體"/>
-        <a:font script="Arab" typeface="Arial"/>
-        <a:font script="Hebr" typeface="Arial"/>
-        <a:font script="Thai" typeface="Cordia New"/>
-        <a:font script="Ethi" typeface="Nyala"/>
-        <a:font script="Beng" typeface="Vrinda"/>
-        <a:font script="Gujr" typeface="Shruti"/>
-        <a:font script="Khmr" typeface="DaunPenh"/>
-        <a:font script="Knda" typeface="Tunga"/>
-        <a:font script="Guru" typeface="Raavi"/>
-        <a:font script="Cans" typeface="Euphemia"/>
-        <a:font script="Cher" typeface="Plantagenet Cherokee"/>
-        <a:font script="Yiii" typeface="Microsoft Yi Baiti"/>
-        <a:font script="Tibt" typeface="Microsoft Himalaya"/>
-        <a:font script="Thaa" typeface="MV Boli"/>
-        <a:font script="Deva" typeface="Mangal"/>
-        <a:font script="Telu" typeface="Gautami"/>
-        <a:font script="Taml" typeface="Latha"/>
-        <a:font script="Syrc" typeface="Estrangelo Edessa"/>
-        <a:font script="Orya" typeface="Kalinga"/>
-        <a:font script="Mlym" typeface="Kartika"/>
-        <a:font script="Laoo" typeface="DokChampa"/>
-        <a:font script="Sinh" typeface="Iskoola Pota"/>
-        <a:font script="Mong" typeface="Mongolian Baiti"/>
-        <a:font script="Viet" typeface="Arial"/>
-        <a:font script="Uigh" typeface="Microsoft Uighur"/>
-        <a:font script="Geor" typeface="Sylfaen"/>
-        <a:font script="Armn" typeface="Arial"/>
-        <a:font script="Bugi" typeface="Leelawadee UI"/>
-        <a:font script="Bopo" typeface="Microsoft JhengHei"/>
-        <a:font script="Java" typeface="Javanese Text"/>
-        <a:font script="Lisu" typeface="Segoe UI"/>
-        <a:font script="Mymr" typeface="Myanmar Text"/>
-        <a:font script="Nkoo" typeface="Ebrima"/>
-        <a:font script="Olck" typeface="Nirmala UI"/>
-        <a:font script="Osma" typeface="Ebrima"/>
-        <a:font script="Phag" typeface="Phagspa"/>
-        <a:font script="Syrn" typeface="Estrangelo Edessa"/>
-        <a:font script="Syrj" typeface="Estrangelo Edessa"/>
-        <a:font script="Syre" typeface="Estrangelo Edessa"/>
-        <a:font script="Sora" typeface="Nirmala UI"/>
-        <a:font script="Tale" typeface="Microsoft Tai Le"/>
-        <a:font script="Talu" typeface="Microsoft New Tai Lue"/>
-        <a:font script="Tfng" typeface="Ebrima"/>
-      </a:minorFont>
-    </a:fontScheme>
-    <a:fmtScheme name="Office">
-      <a:fillStyleLst>
-        <a:solidFill>
-          <a:schemeClr val="phClr"/>
-        </a:solidFill>
-        <a:gradFill rotWithShape="1">
-          <a:gsLst>
-            <a:gs pos="0">
-              <a:schemeClr val="phClr">
-                <a:lumMod val="110000"/>
-                <a:satMod val="105000"/>
-                <a:tint val="67000"/>
-              </a:schemeClr>
-            </a:gs>
-            <a:gs pos="50000">
-              <a:schemeClr val="phClr">
-                <a:lumMod val="105000"/>
-                <a:satMod val="103000"/>
-                <a:tint val="73000"/>
-              </a:schemeClr>
-            </a:gs>
-            <a:gs pos="100000">
-              <a:schemeClr val="phClr">
-                <a:lumMod val="105000"/>
-                <a:satMod val="109000"/>
-                <a:tint val="81000"/>
-              </a:schemeClr>
-            </a:gs>
-          </a:gsLst>
-          <a:lin ang="5400000" scaled="0"/>
-        </a:gradFill>
-        <a:gradFill rotWithShape="1">
-          <a:gsLst>
-            <a:gs pos="0">
-              <a:schemeClr val="phClr">
-                <a:satMod val="103000"/>
-                <a:lumMod val="102000"/>
-                <a:tint val="94000"/>
-              </a:schemeClr>
-            </a:gs>
-            <a:gs pos="50000">
-              <a:schemeClr val="phClr">
-                <a:satMod val="110000"/>
-                <a:lumMod val="100000"/>
-                <a:shade val="100000"/>
-              </a:schemeClr>
-            </a:gs>
-            <a:gs pos="100000">
-              <a:schemeClr val="phClr">
-                <a:lumMod val="99000"/>
-                <a:satMod val="120000"/>
-                <a:shade val="78000"/>
-              </a:schemeClr>
-            </a:gs>
-          </a:gsLst>
-          <a:lin ang="5400000" scaled="0"/>
-        </a:gradFill>
-      </a:fillStyleLst>
-      <a:lnStyleLst>
-        <a:ln w="6350" cap="flat" cmpd="sng" algn="ctr">
-          <a:solidFill>
-            <a:schemeClr val="phClr"/>
-          </a:solidFill>
-          <a:prstDash val="solid"/>
-          <a:miter lim="800000"/>
-        </a:ln>
-        <a:ln w="12700" cap="flat" cmpd="sng" algn="ctr">
-          <a:solidFill>
-            <a:schemeClr val="phClr"/>
-          </a:solidFill>
-          <a:prstDash val="solid"/>
-          <a:miter lim="800000"/>
-        </a:ln>
-        <a:ln w="19050" cap="flat" cmpd="sng" algn="ctr">
-          <a:solidFill>
-            <a:schemeClr val="phClr"/>
-          </a:solidFill>
-          <a:prstDash val="solid"/>
-          <a:miter lim="800000"/>
-        </a:ln>
-      </a:lnStyleLst>
-      <a:effectStyleLst>
-        <a:effectStyle>
-          <a:effectLst/>
-        </a:effectStyle>
-        <a:effectStyle>
-          <a:effectLst/>
-        </a:effectStyle>
-        <a:effectStyle>
-          <a:effectLst>
-            <a:outerShdw blurRad="57150" dist="19050" dir="5400000" algn="ctr" rotWithShape="0">
-              <a:srgbClr val="000000">
-                <a:alpha val="63000"/>
-              </a:srgbClr>
-            </a:outerShdw>
-          </a:effectLst>
-        </a:effectStyle>
-      </a:effectStyleLst>
-      <a:bgFillStyleLst>
-        <a:solidFill>
-          <a:schemeClr val="phClr"/>
-        </a:solidFill>
-        <a:solidFill>
-          <a:schemeClr val="phClr">
-            <a:tint val="95000"/>
-            <a:satMod val="170000"/>
-          </a:schemeClr>
-        </a:solidFill>
-        <a:gradFill rotWithShape="1">
-          <a:gsLst>
-            <a:gs pos="0">
-              <a:schemeClr val="phClr">
-                <a:tint val="93000"/>
-                <a:satMod val="150000"/>
-                <a:shade val="98000"/>
-                <a:lumMod val="102000"/>
-              </a:schemeClr>
-            </a:gs>
-            <a:gs pos="50000">
-              <a:schemeClr val="phClr">
-                <a:tint val="98000"/>
-                <a:satMod val="130000"/>
-                <a:shade val="90000"/>
-                <a:lumMod val="103000"/>
-              </a:schemeClr>
-            </a:gs>
-            <a:gs pos="100000">
-              <a:schemeClr val="phClr">
-                <a:shade val="63000"/>
-                <a:satMod val="120000"/>
-              </a:schemeClr>
-            </a:gs>
-          </a:gsLst>
-          <a:lin ang="5400000" scaled="0"/>
-        </a:gradFill>
-      </a:bgFillStyleLst>
-    </a:fmtScheme>
-  </a:themeElements>
-  <a:objectDefaults/>
-  <a:extraClrSchemeLst/>
-  <a:extLst>
-    <a:ext uri="{05A4C25C-085E-4340-85A3-A5531E510DB2}">
-      <thm15:themeFamily xmlns:thm15="http://schemas.microsoft.com/office/thememl/2012/main" name="Office Theme" id="{62F939B6-93AF-4DB8-9C6B-D6C7DFDC589F}" vid="{4A3C46E8-61CC-4603-A589-7422A47A8E4A}"/>
-    </a:ext>
-  </a:extLst>
-</a:theme>
-</file>
-
-<file path=ppt/theme/theme3.xml><?xml version="1.0" encoding="utf-8"?>
-<a:theme xmlns:a="http://schemas.openxmlformats.org/drawingml/2006/main" name="Office Theme">
-  <a:themeElements>
-    <a:clrScheme name="Office">
-      <a:dk1>
-        <a:sysClr val="windowText" lastClr="000000"/>
-      </a:dk1>
-      <a:lt1>
-        <a:sysClr val="window" lastClr="FFFFFF"/>
-      </a:lt1>
-      <a:dk2>
         <a:srgbClr val="1F497D"/>
       </a:dk2>
       <a:lt2>

</xml_diff>